<commit_message>
checked and updated d2/s3
</commit_message>
<xml_diff>
--- a/doc/slides/day2/session3/RCS.pptx
+++ b/doc/slides/day2/session3/RCS.pptx
@@ -1,6 +1,6 @@
 
 <file path=ppt/presentation.xml><?xml version="1.0" encoding="utf-8"?>
-<p:presentation xmlns:a="http://schemas.openxmlformats.org/drawingml/2006/main" xmlns:r="http://schemas.openxmlformats.org/officeDocument/2006/relationships" xmlns:mc="http://schemas.openxmlformats.org/markup-compatibility/2006" xmlns:mv="urn:schemas-microsoft-com:mac:vml" xmlns:p="http://schemas.openxmlformats.org/presentationml/2006/main" mc:Ignorable="mv" mc:PreserveAttributes="mv:*" saveSubsetFonts="1" autoCompressPictures="0">
+<p:presentation xmlns:a="http://schemas.openxmlformats.org/drawingml/2006/main" xmlns:r="http://schemas.openxmlformats.org/officeDocument/2006/relationships" xmlns:p="http://schemas.openxmlformats.org/presentationml/2006/main" saveSubsetFonts="1" autoCompressPictures="0">
   <p:sldMasterIdLst>
     <p:sldMasterId id="2147483648" r:id="rId1"/>
   </p:sldMasterIdLst>
@@ -123,7 +123,7 @@
 </file>
 
 <file path=ppt/notesMasters/notesMaster1.xml><?xml version="1.0" encoding="utf-8"?>
-<p:notesMaster xmlns:a="http://schemas.openxmlformats.org/drawingml/2006/main" xmlns:r="http://schemas.openxmlformats.org/officeDocument/2006/relationships" xmlns:mc="http://schemas.openxmlformats.org/markup-compatibility/2006" xmlns:mv="urn:schemas-microsoft-com:mac:vml" xmlns:p="http://schemas.openxmlformats.org/presentationml/2006/main" mc:Ignorable="mv" mc:PreserveAttributes="mv:*">
+<p:notesMaster xmlns:a="http://schemas.openxmlformats.org/drawingml/2006/main" xmlns:r="http://schemas.openxmlformats.org/officeDocument/2006/relationships" xmlns:p="http://schemas.openxmlformats.org/presentationml/2006/main">
   <p:cSld>
     <p:bg>
       <p:bgRef idx="1001">
@@ -205,7 +205,7 @@
             <a:fld id="{D82FF0E2-E47A-A340-9B4D-91808E467950}" type="datetimeFigureOut">
               <a:rPr lang="en-US" smtClean="0"/>
               <a:pPr/>
-              <a:t>9/8/12</a:t>
+              <a:t>10/17/13</a:t>
             </a:fld>
             <a:endParaRPr lang="en-US"/>
           </a:p>
@@ -367,13 +367,18 @@
             <a:fld id="{A6AA6E45-072C-3042-B2D4-A74DF932D6A2}" type="slidenum">
               <a:rPr lang="en-US" smtClean="0"/>
               <a:pPr/>
-              <a:t>‹#›</a:t>
+              <a:t>‹nr.›</a:t>
             </a:fld>
             <a:endParaRPr lang="en-US"/>
           </a:p>
         </p:txBody>
       </p:sp>
     </p:spTree>
+    <p:extLst>
+      <p:ext uri="{BB962C8B-B14F-4D97-AF65-F5344CB8AC3E}">
+        <p14:creationId xmlns:p14="http://schemas.microsoft.com/office/powerpoint/2010/main" val="2379408580"/>
+      </p:ext>
+    </p:extLst>
   </p:cSld>
   <p:clrMap bg1="lt1" tx1="dk1" bg2="lt2" tx2="dk2" accent1="accent1" accent2="accent2" accent3="accent3" accent4="accent4" accent5="accent5" accent6="accent6" hlink="hlink" folHlink="folHlink"/>
   <p:notesStyle>
@@ -472,7 +477,7 @@
 </file>
 
 <file path=ppt/notesSlides/notesSlide1.xml><?xml version="1.0" encoding="utf-8"?>
-<p:notes xmlns:a="http://schemas.openxmlformats.org/drawingml/2006/main" xmlns:r="http://schemas.openxmlformats.org/officeDocument/2006/relationships" xmlns:mc="http://schemas.openxmlformats.org/markup-compatibility/2006" xmlns:mv="urn:schemas-microsoft-com:mac:vml" xmlns:p="http://schemas.openxmlformats.org/presentationml/2006/main" mc:Ignorable="mv" mc:PreserveAttributes="mv:*">
+<p:notes xmlns:a="http://schemas.openxmlformats.org/drawingml/2006/main" xmlns:r="http://schemas.openxmlformats.org/officeDocument/2006/relationships" xmlns:p="http://schemas.openxmlformats.org/presentationml/2006/main">
   <p:cSld>
     <p:spTree>
       <p:nvGrpSpPr>
@@ -586,7 +591,7 @@
 </file>
 
 <file path=ppt/notesSlides/notesSlide2.xml><?xml version="1.0" encoding="utf-8"?>
-<p:notes xmlns:a="http://schemas.openxmlformats.org/drawingml/2006/main" xmlns:r="http://schemas.openxmlformats.org/officeDocument/2006/relationships" xmlns:mc="http://schemas.openxmlformats.org/markup-compatibility/2006" xmlns:mv="urn:schemas-microsoft-com:mac:vml" xmlns:p="http://schemas.openxmlformats.org/presentationml/2006/main" mc:Ignorable="mv" mc:PreserveAttributes="mv:*">
+<p:notes xmlns:a="http://schemas.openxmlformats.org/drawingml/2006/main" xmlns:r="http://schemas.openxmlformats.org/officeDocument/2006/relationships" xmlns:p="http://schemas.openxmlformats.org/presentationml/2006/main">
   <p:cSld>
     <p:spTree>
       <p:nvGrpSpPr>
@@ -676,7 +681,7 @@
 </file>
 
 <file path=ppt/slideLayouts/slideLayout1.xml><?xml version="1.0" encoding="utf-8"?>
-<p:sldLayout xmlns:a="http://schemas.openxmlformats.org/drawingml/2006/main" xmlns:r="http://schemas.openxmlformats.org/officeDocument/2006/relationships" xmlns:mc="http://schemas.openxmlformats.org/markup-compatibility/2006" xmlns:mv="urn:schemas-microsoft-com:mac:vml" xmlns:p="http://schemas.openxmlformats.org/presentationml/2006/main" mc:Ignorable="mv" mc:PreserveAttributes="mv:*" type="title" preserve="1">
+<p:sldLayout xmlns:a="http://schemas.openxmlformats.org/drawingml/2006/main" xmlns:r="http://schemas.openxmlformats.org/officeDocument/2006/relationships" xmlns:p="http://schemas.openxmlformats.org/presentationml/2006/main" type="title" preserve="1">
   <p:cSld name="Title Slide">
     <p:spTree>
       <p:nvGrpSpPr>
@@ -857,7 +862,7 @@
             <a:fld id="{C5F836F2-CA5C-0245-8085-6BA20A5317C4}" type="datetimeFigureOut">
               <a:rPr lang="en-US" smtClean="0"/>
               <a:pPr/>
-              <a:t>9/8/12</a:t>
+              <a:t>10/17/13</a:t>
             </a:fld>
             <a:endParaRPr lang="en-US"/>
           </a:p>
@@ -900,7 +905,7 @@
             <a:fld id="{9D2AB568-430C-6344-8138-EF40E48458A9}" type="slidenum">
               <a:rPr lang="en-US" smtClean="0"/>
               <a:pPr/>
-              <a:t>‹#›</a:t>
+              <a:t>‹nr.›</a:t>
             </a:fld>
             <a:endParaRPr lang="en-US"/>
           </a:p>
@@ -915,7 +920,7 @@
 </file>
 
 <file path=ppt/slideLayouts/slideLayout10.xml><?xml version="1.0" encoding="utf-8"?>
-<p:sldLayout xmlns:a="http://schemas.openxmlformats.org/drawingml/2006/main" xmlns:r="http://schemas.openxmlformats.org/officeDocument/2006/relationships" xmlns:mc="http://schemas.openxmlformats.org/markup-compatibility/2006" xmlns:mv="urn:schemas-microsoft-com:mac:vml" xmlns:p="http://schemas.openxmlformats.org/presentationml/2006/main" mc:Ignorable="mv" mc:PreserveAttributes="mv:*" type="vertTx" preserve="1">
+<p:sldLayout xmlns:a="http://schemas.openxmlformats.org/drawingml/2006/main" xmlns:r="http://schemas.openxmlformats.org/officeDocument/2006/relationships" xmlns:p="http://schemas.openxmlformats.org/presentationml/2006/main" type="vertTx" preserve="1">
   <p:cSld name="Title and Vertical Text">
     <p:spTree>
       <p:nvGrpSpPr>
@@ -1024,7 +1029,7 @@
             <a:fld id="{C5F836F2-CA5C-0245-8085-6BA20A5317C4}" type="datetimeFigureOut">
               <a:rPr lang="en-US" smtClean="0"/>
               <a:pPr/>
-              <a:t>9/8/12</a:t>
+              <a:t>10/17/13</a:t>
             </a:fld>
             <a:endParaRPr lang="en-US"/>
           </a:p>
@@ -1067,7 +1072,7 @@
             <a:fld id="{9D2AB568-430C-6344-8138-EF40E48458A9}" type="slidenum">
               <a:rPr lang="en-US" smtClean="0"/>
               <a:pPr/>
-              <a:t>‹#›</a:t>
+              <a:t>‹nr.›</a:t>
             </a:fld>
             <a:endParaRPr lang="en-US"/>
           </a:p>
@@ -1082,7 +1087,7 @@
 </file>
 
 <file path=ppt/slideLayouts/slideLayout11.xml><?xml version="1.0" encoding="utf-8"?>
-<p:sldLayout xmlns:a="http://schemas.openxmlformats.org/drawingml/2006/main" xmlns:r="http://schemas.openxmlformats.org/officeDocument/2006/relationships" xmlns:mc="http://schemas.openxmlformats.org/markup-compatibility/2006" xmlns:mv="urn:schemas-microsoft-com:mac:vml" xmlns:p="http://schemas.openxmlformats.org/presentationml/2006/main" mc:Ignorable="mv" mc:PreserveAttributes="mv:*" type="vertTitleAndTx" preserve="1">
+<p:sldLayout xmlns:a="http://schemas.openxmlformats.org/drawingml/2006/main" xmlns:r="http://schemas.openxmlformats.org/officeDocument/2006/relationships" xmlns:p="http://schemas.openxmlformats.org/presentationml/2006/main" type="vertTitleAndTx" preserve="1">
   <p:cSld name="Vertical Title and Text">
     <p:spTree>
       <p:nvGrpSpPr>
@@ -1201,7 +1206,7 @@
             <a:fld id="{C5F836F2-CA5C-0245-8085-6BA20A5317C4}" type="datetimeFigureOut">
               <a:rPr lang="en-US" smtClean="0"/>
               <a:pPr/>
-              <a:t>9/8/12</a:t>
+              <a:t>10/17/13</a:t>
             </a:fld>
             <a:endParaRPr lang="en-US"/>
           </a:p>
@@ -1244,7 +1249,7 @@
             <a:fld id="{9D2AB568-430C-6344-8138-EF40E48458A9}" type="slidenum">
               <a:rPr lang="en-US" smtClean="0"/>
               <a:pPr/>
-              <a:t>‹#›</a:t>
+              <a:t>‹nr.›</a:t>
             </a:fld>
             <a:endParaRPr lang="en-US"/>
           </a:p>
@@ -1259,7 +1264,7 @@
 </file>
 
 <file path=ppt/slideLayouts/slideLayout2.xml><?xml version="1.0" encoding="utf-8"?>
-<p:sldLayout xmlns:a="http://schemas.openxmlformats.org/drawingml/2006/main" xmlns:r="http://schemas.openxmlformats.org/officeDocument/2006/relationships" xmlns:mc="http://schemas.openxmlformats.org/markup-compatibility/2006" xmlns:mv="urn:schemas-microsoft-com:mac:vml" xmlns:p="http://schemas.openxmlformats.org/presentationml/2006/main" mc:Ignorable="mv" mc:PreserveAttributes="mv:*" type="obj" preserve="1">
+<p:sldLayout xmlns:a="http://schemas.openxmlformats.org/drawingml/2006/main" xmlns:r="http://schemas.openxmlformats.org/officeDocument/2006/relationships" xmlns:p="http://schemas.openxmlformats.org/presentationml/2006/main" type="obj" preserve="1">
   <p:cSld name="Title and Content">
     <p:spTree>
       <p:nvGrpSpPr>
@@ -1368,7 +1373,7 @@
             <a:fld id="{C5F836F2-CA5C-0245-8085-6BA20A5317C4}" type="datetimeFigureOut">
               <a:rPr lang="en-US" smtClean="0"/>
               <a:pPr/>
-              <a:t>9/8/12</a:t>
+              <a:t>10/17/13</a:t>
             </a:fld>
             <a:endParaRPr lang="en-US"/>
           </a:p>
@@ -1411,7 +1416,7 @@
             <a:fld id="{9D2AB568-430C-6344-8138-EF40E48458A9}" type="slidenum">
               <a:rPr lang="en-US" smtClean="0"/>
               <a:pPr/>
-              <a:t>‹#›</a:t>
+              <a:t>‹nr.›</a:t>
             </a:fld>
             <a:endParaRPr lang="en-US"/>
           </a:p>
@@ -1426,7 +1431,7 @@
 </file>
 
 <file path=ppt/slideLayouts/slideLayout3.xml><?xml version="1.0" encoding="utf-8"?>
-<p:sldLayout xmlns:a="http://schemas.openxmlformats.org/drawingml/2006/main" xmlns:r="http://schemas.openxmlformats.org/officeDocument/2006/relationships" xmlns:mc="http://schemas.openxmlformats.org/markup-compatibility/2006" xmlns:mv="urn:schemas-microsoft-com:mac:vml" xmlns:p="http://schemas.openxmlformats.org/presentationml/2006/main" mc:Ignorable="mv" mc:PreserveAttributes="mv:*" type="secHead" preserve="1">
+<p:sldLayout xmlns:a="http://schemas.openxmlformats.org/drawingml/2006/main" xmlns:r="http://schemas.openxmlformats.org/officeDocument/2006/relationships" xmlns:p="http://schemas.openxmlformats.org/presentationml/2006/main" type="secHead" preserve="1">
   <p:cSld name="Section Header">
     <p:spTree>
       <p:nvGrpSpPr>
@@ -1611,7 +1616,7 @@
             <a:fld id="{C5F836F2-CA5C-0245-8085-6BA20A5317C4}" type="datetimeFigureOut">
               <a:rPr lang="en-US" smtClean="0"/>
               <a:pPr/>
-              <a:t>9/8/12</a:t>
+              <a:t>10/17/13</a:t>
             </a:fld>
             <a:endParaRPr lang="en-US"/>
           </a:p>
@@ -1654,7 +1659,7 @@
             <a:fld id="{9D2AB568-430C-6344-8138-EF40E48458A9}" type="slidenum">
               <a:rPr lang="en-US" smtClean="0"/>
               <a:pPr/>
-              <a:t>‹#›</a:t>
+              <a:t>‹nr.›</a:t>
             </a:fld>
             <a:endParaRPr lang="en-US"/>
           </a:p>
@@ -1669,7 +1674,7 @@
 </file>
 
 <file path=ppt/slideLayouts/slideLayout4.xml><?xml version="1.0" encoding="utf-8"?>
-<p:sldLayout xmlns:a="http://schemas.openxmlformats.org/drawingml/2006/main" xmlns:r="http://schemas.openxmlformats.org/officeDocument/2006/relationships" xmlns:mc="http://schemas.openxmlformats.org/markup-compatibility/2006" xmlns:mv="urn:schemas-microsoft-com:mac:vml" xmlns:p="http://schemas.openxmlformats.org/presentationml/2006/main" mc:Ignorable="mv" mc:PreserveAttributes="mv:*" type="twoObj" preserve="1">
+<p:sldLayout xmlns:a="http://schemas.openxmlformats.org/drawingml/2006/main" xmlns:r="http://schemas.openxmlformats.org/officeDocument/2006/relationships" xmlns:p="http://schemas.openxmlformats.org/presentationml/2006/main" type="twoObj" preserve="1">
   <p:cSld name="Two Content">
     <p:spTree>
       <p:nvGrpSpPr>
@@ -1896,7 +1901,7 @@
             <a:fld id="{C5F836F2-CA5C-0245-8085-6BA20A5317C4}" type="datetimeFigureOut">
               <a:rPr lang="en-US" smtClean="0"/>
               <a:pPr/>
-              <a:t>9/8/12</a:t>
+              <a:t>10/17/13</a:t>
             </a:fld>
             <a:endParaRPr lang="en-US"/>
           </a:p>
@@ -1939,7 +1944,7 @@
             <a:fld id="{9D2AB568-430C-6344-8138-EF40E48458A9}" type="slidenum">
               <a:rPr lang="en-US" smtClean="0"/>
               <a:pPr/>
-              <a:t>‹#›</a:t>
+              <a:t>‹nr.›</a:t>
             </a:fld>
             <a:endParaRPr lang="en-US"/>
           </a:p>
@@ -1954,7 +1959,7 @@
 </file>
 
 <file path=ppt/slideLayouts/slideLayout5.xml><?xml version="1.0" encoding="utf-8"?>
-<p:sldLayout xmlns:a="http://schemas.openxmlformats.org/drawingml/2006/main" xmlns:r="http://schemas.openxmlformats.org/officeDocument/2006/relationships" xmlns:mc="http://schemas.openxmlformats.org/markup-compatibility/2006" xmlns:mv="urn:schemas-microsoft-com:mac:vml" xmlns:p="http://schemas.openxmlformats.org/presentationml/2006/main" mc:Ignorable="mv" mc:PreserveAttributes="mv:*" type="twoTxTwoObj" preserve="1">
+<p:sldLayout xmlns:a="http://schemas.openxmlformats.org/drawingml/2006/main" xmlns:r="http://schemas.openxmlformats.org/officeDocument/2006/relationships" xmlns:p="http://schemas.openxmlformats.org/presentationml/2006/main" type="twoTxTwoObj" preserve="1">
   <p:cSld name="Comparison">
     <p:spTree>
       <p:nvGrpSpPr>
@@ -2315,7 +2320,7 @@
             <a:fld id="{C5F836F2-CA5C-0245-8085-6BA20A5317C4}" type="datetimeFigureOut">
               <a:rPr lang="en-US" smtClean="0"/>
               <a:pPr/>
-              <a:t>9/8/12</a:t>
+              <a:t>10/17/13</a:t>
             </a:fld>
             <a:endParaRPr lang="en-US"/>
           </a:p>
@@ -2358,7 +2363,7 @@
             <a:fld id="{9D2AB568-430C-6344-8138-EF40E48458A9}" type="slidenum">
               <a:rPr lang="en-US" smtClean="0"/>
               <a:pPr/>
-              <a:t>‹#›</a:t>
+              <a:t>‹nr.›</a:t>
             </a:fld>
             <a:endParaRPr lang="en-US"/>
           </a:p>
@@ -2373,7 +2378,7 @@
 </file>
 
 <file path=ppt/slideLayouts/slideLayout6.xml><?xml version="1.0" encoding="utf-8"?>
-<p:sldLayout xmlns:a="http://schemas.openxmlformats.org/drawingml/2006/main" xmlns:r="http://schemas.openxmlformats.org/officeDocument/2006/relationships" xmlns:mc="http://schemas.openxmlformats.org/markup-compatibility/2006" xmlns:mv="urn:schemas-microsoft-com:mac:vml" xmlns:p="http://schemas.openxmlformats.org/presentationml/2006/main" mc:Ignorable="mv" mc:PreserveAttributes="mv:*" type="titleOnly" preserve="1">
+<p:sldLayout xmlns:a="http://schemas.openxmlformats.org/drawingml/2006/main" xmlns:r="http://schemas.openxmlformats.org/officeDocument/2006/relationships" xmlns:p="http://schemas.openxmlformats.org/presentationml/2006/main" type="titleOnly" preserve="1">
   <p:cSld name="Title Only">
     <p:spTree>
       <p:nvGrpSpPr>
@@ -2430,7 +2435,7 @@
             <a:fld id="{C5F836F2-CA5C-0245-8085-6BA20A5317C4}" type="datetimeFigureOut">
               <a:rPr lang="en-US" smtClean="0"/>
               <a:pPr/>
-              <a:t>9/8/12</a:t>
+              <a:t>10/17/13</a:t>
             </a:fld>
             <a:endParaRPr lang="en-US"/>
           </a:p>
@@ -2473,7 +2478,7 @@
             <a:fld id="{9D2AB568-430C-6344-8138-EF40E48458A9}" type="slidenum">
               <a:rPr lang="en-US" smtClean="0"/>
               <a:pPr/>
-              <a:t>‹#›</a:t>
+              <a:t>‹nr.›</a:t>
             </a:fld>
             <a:endParaRPr lang="en-US"/>
           </a:p>
@@ -2488,7 +2493,7 @@
 </file>
 
 <file path=ppt/slideLayouts/slideLayout7.xml><?xml version="1.0" encoding="utf-8"?>
-<p:sldLayout xmlns:a="http://schemas.openxmlformats.org/drawingml/2006/main" xmlns:r="http://schemas.openxmlformats.org/officeDocument/2006/relationships" xmlns:mc="http://schemas.openxmlformats.org/markup-compatibility/2006" xmlns:mv="urn:schemas-microsoft-com:mac:vml" xmlns:p="http://schemas.openxmlformats.org/presentationml/2006/main" mc:Ignorable="mv" mc:PreserveAttributes="mv:*" type="blank" preserve="1">
+<p:sldLayout xmlns:a="http://schemas.openxmlformats.org/drawingml/2006/main" xmlns:r="http://schemas.openxmlformats.org/officeDocument/2006/relationships" xmlns:p="http://schemas.openxmlformats.org/presentationml/2006/main" type="blank" preserve="1">
   <p:cSld name="Blank">
     <p:spTree>
       <p:nvGrpSpPr>
@@ -2522,7 +2527,7 @@
             <a:fld id="{C5F836F2-CA5C-0245-8085-6BA20A5317C4}" type="datetimeFigureOut">
               <a:rPr lang="en-US" smtClean="0"/>
               <a:pPr/>
-              <a:t>9/8/12</a:t>
+              <a:t>10/17/13</a:t>
             </a:fld>
             <a:endParaRPr lang="en-US"/>
           </a:p>
@@ -2565,7 +2570,7 @@
             <a:fld id="{9D2AB568-430C-6344-8138-EF40E48458A9}" type="slidenum">
               <a:rPr lang="en-US" smtClean="0"/>
               <a:pPr/>
-              <a:t>‹#›</a:t>
+              <a:t>‹nr.›</a:t>
             </a:fld>
             <a:endParaRPr lang="en-US"/>
           </a:p>
@@ -2580,7 +2585,7 @@
 </file>
 
 <file path=ppt/slideLayouts/slideLayout8.xml><?xml version="1.0" encoding="utf-8"?>
-<p:sldLayout xmlns:a="http://schemas.openxmlformats.org/drawingml/2006/main" xmlns:r="http://schemas.openxmlformats.org/officeDocument/2006/relationships" xmlns:mc="http://schemas.openxmlformats.org/markup-compatibility/2006" xmlns:mv="urn:schemas-microsoft-com:mac:vml" xmlns:p="http://schemas.openxmlformats.org/presentationml/2006/main" mc:Ignorable="mv" mc:PreserveAttributes="mv:*" type="objTx" preserve="1">
+<p:sldLayout xmlns:a="http://schemas.openxmlformats.org/drawingml/2006/main" xmlns:r="http://schemas.openxmlformats.org/officeDocument/2006/relationships" xmlns:p="http://schemas.openxmlformats.org/presentationml/2006/main" type="objTx" preserve="1">
   <p:cSld name="Content with Caption">
     <p:spTree>
       <p:nvGrpSpPr>
@@ -2796,7 +2801,7 @@
             <a:fld id="{C5F836F2-CA5C-0245-8085-6BA20A5317C4}" type="datetimeFigureOut">
               <a:rPr lang="en-US" smtClean="0"/>
               <a:pPr/>
-              <a:t>9/8/12</a:t>
+              <a:t>10/17/13</a:t>
             </a:fld>
             <a:endParaRPr lang="en-US"/>
           </a:p>
@@ -2839,7 +2844,7 @@
             <a:fld id="{9D2AB568-430C-6344-8138-EF40E48458A9}" type="slidenum">
               <a:rPr lang="en-US" smtClean="0"/>
               <a:pPr/>
-              <a:t>‹#›</a:t>
+              <a:t>‹nr.›</a:t>
             </a:fld>
             <a:endParaRPr lang="en-US"/>
           </a:p>
@@ -2854,7 +2859,7 @@
 </file>
 
 <file path=ppt/slideLayouts/slideLayout9.xml><?xml version="1.0" encoding="utf-8"?>
-<p:sldLayout xmlns:a="http://schemas.openxmlformats.org/drawingml/2006/main" xmlns:r="http://schemas.openxmlformats.org/officeDocument/2006/relationships" xmlns:mc="http://schemas.openxmlformats.org/markup-compatibility/2006" xmlns:mv="urn:schemas-microsoft-com:mac:vml" xmlns:p="http://schemas.openxmlformats.org/presentationml/2006/main" mc:Ignorable="mv" mc:PreserveAttributes="mv:*" type="picTx" preserve="1">
+<p:sldLayout xmlns:a="http://schemas.openxmlformats.org/drawingml/2006/main" xmlns:r="http://schemas.openxmlformats.org/officeDocument/2006/relationships" xmlns:p="http://schemas.openxmlformats.org/presentationml/2006/main" type="picTx" preserve="1">
   <p:cSld name="Picture with Caption">
     <p:spTree>
       <p:nvGrpSpPr>
@@ -3046,7 +3051,7 @@
             <a:fld id="{C5F836F2-CA5C-0245-8085-6BA20A5317C4}" type="datetimeFigureOut">
               <a:rPr lang="en-US" smtClean="0"/>
               <a:pPr/>
-              <a:t>9/8/12</a:t>
+              <a:t>10/17/13</a:t>
             </a:fld>
             <a:endParaRPr lang="en-US"/>
           </a:p>
@@ -3089,7 +3094,7 @@
             <a:fld id="{9D2AB568-430C-6344-8138-EF40E48458A9}" type="slidenum">
               <a:rPr lang="en-US" smtClean="0"/>
               <a:pPr/>
-              <a:t>‹#›</a:t>
+              <a:t>‹nr.›</a:t>
             </a:fld>
             <a:endParaRPr lang="en-US"/>
           </a:p>
@@ -3104,7 +3109,7 @@
 </file>
 
 <file path=ppt/slideMasters/slideMaster1.xml><?xml version="1.0" encoding="utf-8"?>
-<p:sldMaster xmlns:a="http://schemas.openxmlformats.org/drawingml/2006/main" xmlns:r="http://schemas.openxmlformats.org/officeDocument/2006/relationships" xmlns:mc="http://schemas.openxmlformats.org/markup-compatibility/2006" xmlns:mv="urn:schemas-microsoft-com:mac:vml" xmlns:p="http://schemas.openxmlformats.org/presentationml/2006/main" mc:Ignorable="mv" mc:PreserveAttributes="mv:*">
+<p:sldMaster xmlns:a="http://schemas.openxmlformats.org/drawingml/2006/main" xmlns:r="http://schemas.openxmlformats.org/officeDocument/2006/relationships" xmlns:p="http://schemas.openxmlformats.org/presentationml/2006/main">
   <p:cSld>
     <p:bg>
       <p:bgRef idx="1001">
@@ -3256,7 +3261,7 @@
             <a:fld id="{C5F836F2-CA5C-0245-8085-6BA20A5317C4}" type="datetimeFigureOut">
               <a:rPr lang="en-US" smtClean="0"/>
               <a:pPr/>
-              <a:t>9/8/12</a:t>
+              <a:t>10/17/13</a:t>
             </a:fld>
             <a:endParaRPr lang="en-US"/>
           </a:p>
@@ -3335,7 +3340,7 @@
             <a:fld id="{9D2AB568-430C-6344-8138-EF40E48458A9}" type="slidenum">
               <a:rPr lang="en-US" smtClean="0"/>
               <a:pPr/>
-              <a:t>‹#›</a:t>
+              <a:t>‹nr.›</a:t>
             </a:fld>
             <a:endParaRPr lang="en-US"/>
           </a:p>
@@ -3611,7 +3616,7 @@
 </file>
 
 <file path=ppt/slides/slide1.xml><?xml version="1.0" encoding="utf-8"?>
-<p:sld xmlns:a="http://schemas.openxmlformats.org/drawingml/2006/main" xmlns:r="http://schemas.openxmlformats.org/officeDocument/2006/relationships" xmlns:mc="http://schemas.openxmlformats.org/markup-compatibility/2006" xmlns:mv="urn:schemas-microsoft-com:mac:vml" xmlns:p="http://schemas.openxmlformats.org/presentationml/2006/main" mc:Ignorable="mv" mc:PreserveAttributes="mv:*">
+<p:sld xmlns:a="http://schemas.openxmlformats.org/drawingml/2006/main" xmlns:r="http://schemas.openxmlformats.org/officeDocument/2006/relationships" xmlns:p="http://schemas.openxmlformats.org/presentationml/2006/main">
   <p:cSld>
     <p:spTree>
       <p:nvGrpSpPr>
@@ -3646,11 +3651,7 @@
           <a:p>
             <a:r>
               <a:rPr lang="en-US" dirty="0" smtClean="0"/>
-              <a:t>Version</a:t>
-            </a:r>
-            <a:r>
-              <a:rPr lang="en-US" dirty="0" smtClean="0"/>
-              <a:t> Control</a:t>
+              <a:t>Version Control</a:t>
             </a:r>
             <a:r>
               <a:rPr lang="en-US" sz="3556" dirty="0" smtClean="0"/>
@@ -3661,11 +3662,7 @@
             </a:br>
             <a:r>
               <a:rPr lang="en-US" sz="2800" dirty="0" smtClean="0"/>
-              <a:t>aka: Source </a:t>
-            </a:r>
-            <a:r>
-              <a:rPr lang="en-US" sz="2800" dirty="0" smtClean="0"/>
-              <a:t>Control Management</a:t>
+              <a:t>aka: Source Control Management</a:t>
             </a:r>
             <a:endParaRPr lang="en-US" sz="2800" dirty="0"/>
           </a:p>
@@ -3686,14 +3683,6 @@
           <a:bodyPr/>
           <a:lstStyle/>
           <a:p>
-            <a:r>
-              <a:rPr lang="en-US" dirty="0" smtClean="0"/>
-              <a:t>12 September 2012,</a:t>
-            </a:r>
-            <a:r>
-              <a:rPr lang="en-US" dirty="0" smtClean="0"/>
-              <a:t> 14:00-16:00</a:t>
-            </a:r>
             <a:endParaRPr lang="en-US" dirty="0"/>
           </a:p>
         </p:txBody>
@@ -3707,7 +3696,7 @@
 </file>
 
 <file path=ppt/slides/slide10.xml><?xml version="1.0" encoding="utf-8"?>
-<p:sld xmlns:a="http://schemas.openxmlformats.org/drawingml/2006/main" xmlns:r="http://schemas.openxmlformats.org/officeDocument/2006/relationships" xmlns:mc="http://schemas.openxmlformats.org/markup-compatibility/2006" xmlns:mv="urn:schemas-microsoft-com:mac:vml" xmlns:p="http://schemas.openxmlformats.org/presentationml/2006/main" mc:Ignorable="mv" mc:PreserveAttributes="mv:*">
+<p:sld xmlns:a="http://schemas.openxmlformats.org/drawingml/2006/main" xmlns:r="http://schemas.openxmlformats.org/officeDocument/2006/relationships" xmlns:p="http://schemas.openxmlformats.org/presentationml/2006/main">
   <p:cSld>
     <p:spTree>
       <p:nvGrpSpPr>
@@ -4041,7 +4030,7 @@
 </file>
 
 <file path=ppt/slides/slide11.xml><?xml version="1.0" encoding="utf-8"?>
-<p:sld xmlns:a="http://schemas.openxmlformats.org/drawingml/2006/main" xmlns:r="http://schemas.openxmlformats.org/officeDocument/2006/relationships" xmlns:mc="http://schemas.openxmlformats.org/markup-compatibility/2006" xmlns:mv="urn:schemas-microsoft-com:mac:vml" xmlns:p="http://schemas.openxmlformats.org/presentationml/2006/main" mc:Ignorable="mv" mc:PreserveAttributes="mv:*">
+<p:sld xmlns:a="http://schemas.openxmlformats.org/drawingml/2006/main" xmlns:r="http://schemas.openxmlformats.org/officeDocument/2006/relationships" xmlns:p="http://schemas.openxmlformats.org/presentationml/2006/main">
   <p:cSld>
     <p:spTree>
       <p:nvGrpSpPr>
@@ -4174,7 +4163,7 @@
 </file>
 
 <file path=ppt/slides/slide12.xml><?xml version="1.0" encoding="utf-8"?>
-<p:sld xmlns:a="http://schemas.openxmlformats.org/drawingml/2006/main" xmlns:r="http://schemas.openxmlformats.org/officeDocument/2006/relationships" xmlns:mc="http://schemas.openxmlformats.org/markup-compatibility/2006" xmlns:mv="urn:schemas-microsoft-com:mac:vml" xmlns:p="http://schemas.openxmlformats.org/presentationml/2006/main" mc:Ignorable="mv" mc:PreserveAttributes="mv:*">
+<p:sld xmlns:a="http://schemas.openxmlformats.org/drawingml/2006/main" xmlns:r="http://schemas.openxmlformats.org/officeDocument/2006/relationships" xmlns:p="http://schemas.openxmlformats.org/presentationml/2006/main">
   <p:cSld>
     <p:spTree>
       <p:nvGrpSpPr>
@@ -4384,7 +4373,7 @@
 </file>
 
 <file path=ppt/slides/slide13.xml><?xml version="1.0" encoding="utf-8"?>
-<p:sld xmlns:a="http://schemas.openxmlformats.org/drawingml/2006/main" xmlns:r="http://schemas.openxmlformats.org/officeDocument/2006/relationships" xmlns:mc="http://schemas.openxmlformats.org/markup-compatibility/2006" xmlns:mv="urn:schemas-microsoft-com:mac:vml" xmlns:p="http://schemas.openxmlformats.org/presentationml/2006/main" mc:Ignorable="mv" mc:PreserveAttributes="mv:*">
+<p:sld xmlns:a="http://schemas.openxmlformats.org/drawingml/2006/main" xmlns:r="http://schemas.openxmlformats.org/officeDocument/2006/relationships" xmlns:p="http://schemas.openxmlformats.org/presentationml/2006/main">
   <p:cSld>
     <p:spTree>
       <p:nvGrpSpPr>
@@ -4558,12 +4547,13 @@
             </a:r>
             <a:r>
               <a:rPr lang="en-US" dirty="0" err="1" smtClean="0"/>
-              <a:t>ngs</a:t>
-            </a:r>
-            <a:r>
-              <a:rPr lang="en-US" dirty="0" smtClean="0"/>
-              <a:t>-workflow</a:t>
-            </a:r>
+              <a:t>arangs</a:t>
+            </a:r>
+            <a:r>
+              <a:rPr lang="en-US" smtClean="0"/>
+              <a:t> project</a:t>
+            </a:r>
+            <a:endParaRPr lang="en-US" dirty="0" smtClean="0"/>
           </a:p>
           <a:p>
             <a:pPr lvl="1"/>
@@ -4571,7 +4561,17 @@
               <a:rPr lang="en-US" dirty="0" smtClean="0">
                 <a:hlinkClick r:id="rId2"/>
               </a:rPr>
-              <a:t>https://github.com/rvosa/ngs-workflows</a:t>
+              <a:t>https://github.com</a:t>
+            </a:r>
+            <a:r>
+              <a:rPr lang="en-US" dirty="0" smtClean="0">
+                <a:hlinkClick r:id="rId2"/>
+              </a:rPr>
+              <a:t>/naturalis/arangs</a:t>
+            </a:r>
+            <a:r>
+              <a:rPr lang="en-US" dirty="0" smtClean="0"/>
+              <a:t> </a:t>
             </a:r>
             <a:endParaRPr lang="en-US" dirty="0" smtClean="0"/>
           </a:p>
@@ -4589,7 +4589,7 @@
 </file>
 
 <file path=ppt/slides/slide2.xml><?xml version="1.0" encoding="utf-8"?>
-<p:sld xmlns:a="http://schemas.openxmlformats.org/drawingml/2006/main" xmlns:r="http://schemas.openxmlformats.org/officeDocument/2006/relationships" xmlns:mc="http://schemas.openxmlformats.org/markup-compatibility/2006" xmlns:mv="urn:schemas-microsoft-com:mac:vml" xmlns:p="http://schemas.openxmlformats.org/presentationml/2006/main" mc:Ignorable="mv" mc:PreserveAttributes="mv:*">
+<p:sld xmlns:a="http://schemas.openxmlformats.org/drawingml/2006/main" xmlns:r="http://schemas.openxmlformats.org/officeDocument/2006/relationships" xmlns:p="http://schemas.openxmlformats.org/presentationml/2006/main">
   <p:cSld>
     <p:spTree>
       <p:nvGrpSpPr>
@@ -4701,7 +4701,7 @@
 </file>
 
 <file path=ppt/slides/slide3.xml><?xml version="1.0" encoding="utf-8"?>
-<p:sld xmlns:a="http://schemas.openxmlformats.org/drawingml/2006/main" xmlns:r="http://schemas.openxmlformats.org/officeDocument/2006/relationships" xmlns:mc="http://schemas.openxmlformats.org/markup-compatibility/2006" xmlns:mv="urn:schemas-microsoft-com:mac:vml" xmlns:p="http://schemas.openxmlformats.org/presentationml/2006/main" mc:Ignorable="mv" mc:PreserveAttributes="mv:*">
+<p:sld xmlns:a="http://schemas.openxmlformats.org/drawingml/2006/main" xmlns:r="http://schemas.openxmlformats.org/officeDocument/2006/relationships" xmlns:p="http://schemas.openxmlformats.org/presentationml/2006/main">
   <p:cSld>
     <p:spTree>
       <p:nvGrpSpPr>
@@ -4813,7 +4813,7 @@
 </file>
 
 <file path=ppt/slides/slide4.xml><?xml version="1.0" encoding="utf-8"?>
-<p:sld xmlns:a="http://schemas.openxmlformats.org/drawingml/2006/main" xmlns:r="http://schemas.openxmlformats.org/officeDocument/2006/relationships" xmlns:mc="http://schemas.openxmlformats.org/markup-compatibility/2006" xmlns:mv="urn:schemas-microsoft-com:mac:vml" xmlns:p="http://schemas.openxmlformats.org/presentationml/2006/main" mc:Ignorable="mv" mc:PreserveAttributes="mv:*">
+<p:sld xmlns:a="http://schemas.openxmlformats.org/drawingml/2006/main" xmlns:r="http://schemas.openxmlformats.org/officeDocument/2006/relationships" xmlns:p="http://schemas.openxmlformats.org/presentationml/2006/main">
   <p:cSld>
     <p:spTree>
       <p:nvGrpSpPr>
@@ -4947,7 +4947,7 @@
 </file>
 
 <file path=ppt/slides/slide5.xml><?xml version="1.0" encoding="utf-8"?>
-<p:sld xmlns:a="http://schemas.openxmlformats.org/drawingml/2006/main" xmlns:r="http://schemas.openxmlformats.org/officeDocument/2006/relationships" xmlns:mc="http://schemas.openxmlformats.org/markup-compatibility/2006" xmlns:mv="urn:schemas-microsoft-com:mac:vml" xmlns:p="http://schemas.openxmlformats.org/presentationml/2006/main" mc:Ignorable="mv" mc:PreserveAttributes="mv:*">
+<p:sld xmlns:a="http://schemas.openxmlformats.org/drawingml/2006/main" xmlns:r="http://schemas.openxmlformats.org/officeDocument/2006/relationships" xmlns:p="http://schemas.openxmlformats.org/presentationml/2006/main">
   <p:cSld>
     <p:spTree>
       <p:nvGrpSpPr>
@@ -5031,7 +5031,7 @@
 </file>
 
 <file path=ppt/slides/slide6.xml><?xml version="1.0" encoding="utf-8"?>
-<p:sld xmlns:a="http://schemas.openxmlformats.org/drawingml/2006/main" xmlns:r="http://schemas.openxmlformats.org/officeDocument/2006/relationships" xmlns:mc="http://schemas.openxmlformats.org/markup-compatibility/2006" xmlns:mv="urn:schemas-microsoft-com:mac:vml" xmlns:p="http://schemas.openxmlformats.org/presentationml/2006/main" mc:Ignorable="mv" mc:PreserveAttributes="mv:*">
+<p:sld xmlns:a="http://schemas.openxmlformats.org/drawingml/2006/main" xmlns:r="http://schemas.openxmlformats.org/officeDocument/2006/relationships" xmlns:p="http://schemas.openxmlformats.org/presentationml/2006/main">
   <p:cSld>
     <p:spTree>
       <p:nvGrpSpPr>
@@ -5210,7 +5210,7 @@
 </file>
 
 <file path=ppt/slides/slide7.xml><?xml version="1.0" encoding="utf-8"?>
-<p:sld xmlns:a="http://schemas.openxmlformats.org/drawingml/2006/main" xmlns:r="http://schemas.openxmlformats.org/officeDocument/2006/relationships" xmlns:mc="http://schemas.openxmlformats.org/markup-compatibility/2006" xmlns:mv="urn:schemas-microsoft-com:mac:vml" xmlns:p="http://schemas.openxmlformats.org/presentationml/2006/main" mc:Ignorable="mv" mc:PreserveAttributes="mv:*">
+<p:sld xmlns:a="http://schemas.openxmlformats.org/drawingml/2006/main" xmlns:r="http://schemas.openxmlformats.org/officeDocument/2006/relationships" xmlns:p="http://schemas.openxmlformats.org/presentationml/2006/main">
   <p:cSld>
     <p:spTree>
       <p:nvGrpSpPr>
@@ -5407,7 +5407,7 @@
 </file>
 
 <file path=ppt/slides/slide8.xml><?xml version="1.0" encoding="utf-8"?>
-<p:sld xmlns:a="http://schemas.openxmlformats.org/drawingml/2006/main" xmlns:r="http://schemas.openxmlformats.org/officeDocument/2006/relationships" xmlns:mc="http://schemas.openxmlformats.org/markup-compatibility/2006" xmlns:mv="urn:schemas-microsoft-com:mac:vml" xmlns:p="http://schemas.openxmlformats.org/presentationml/2006/main" mc:Ignorable="mv" mc:PreserveAttributes="mv:*">
+<p:sld xmlns:a="http://schemas.openxmlformats.org/drawingml/2006/main" xmlns:r="http://schemas.openxmlformats.org/officeDocument/2006/relationships" xmlns:p="http://schemas.openxmlformats.org/presentationml/2006/main">
   <p:cSld>
     <p:spTree>
       <p:nvGrpSpPr>
@@ -5528,7 +5528,7 @@
 </file>
 
 <file path=ppt/slides/slide9.xml><?xml version="1.0" encoding="utf-8"?>
-<p:sld xmlns:a="http://schemas.openxmlformats.org/drawingml/2006/main" xmlns:r="http://schemas.openxmlformats.org/officeDocument/2006/relationships" xmlns:mc="http://schemas.openxmlformats.org/markup-compatibility/2006" xmlns:mv="urn:schemas-microsoft-com:mac:vml" xmlns:p="http://schemas.openxmlformats.org/presentationml/2006/main" mc:Ignorable="mv" mc:PreserveAttributes="mv:*">
+<p:sld xmlns:a="http://schemas.openxmlformats.org/drawingml/2006/main" xmlns:r="http://schemas.openxmlformats.org/officeDocument/2006/relationships" xmlns:p="http://schemas.openxmlformats.org/presentationml/2006/main">
   <p:cSld>
     <p:spTree>
       <p:nvGrpSpPr>

</xml_diff>